<commit_message>
Finished Poster for science fair
</commit_message>
<xml_diff>
--- a/Science Fair 2017-2018/sciencefair.pptx
+++ b/Science Fair 2017-2018/sciencefair.pptx
@@ -798,7 +798,7 @@
           <a:lstStyle/>
           <a:p>
             <a:pPr>
-              <a:defRPr sz="900" b="0" i="0" u="none" strike="noStrike" kern="1200" baseline="0">
+              <a:defRPr sz="1800" b="0" i="0" u="none" strike="noStrike" kern="1200" baseline="0">
                 <a:solidFill>
                   <a:schemeClr val="lt1">
                     <a:lumMod val="75000"/>
@@ -856,7 +856,7 @@
           <a:lstStyle/>
           <a:p>
             <a:pPr>
-              <a:defRPr sz="900" b="0" i="0" u="none" strike="noStrike" kern="1200" baseline="0">
+              <a:defRPr sz="1800" b="0" i="0" u="none" strike="noStrike" kern="1200" baseline="0">
                 <a:solidFill>
                   <a:schemeClr val="lt1">
                     <a:lumMod val="75000"/>
@@ -898,7 +898,7 @@
         <a:lstStyle/>
         <a:p>
           <a:pPr>
-            <a:defRPr sz="900" b="0" i="0" u="none" strike="noStrike" kern="1200" baseline="0">
+            <a:defRPr sz="1800" b="0" i="0" u="none" strike="noStrike" kern="1200" baseline="0">
               <a:solidFill>
                 <a:schemeClr val="lt1">
                   <a:lumMod val="75000"/>
@@ -1590,7 +1590,7 @@
           <a:lstStyle/>
           <a:p>
             <a:pPr>
-              <a:defRPr sz="900" b="0" i="0" u="none" strike="noStrike" kern="1200" baseline="0">
+              <a:defRPr sz="1800" b="0" i="0" u="none" strike="noStrike" kern="1200" baseline="0">
                 <a:solidFill>
                   <a:schemeClr val="lt1">
                     <a:lumMod val="75000"/>
@@ -1690,7 +1690,7 @@
         <a:lstStyle/>
         <a:p>
           <a:pPr>
-            <a:defRPr sz="900" b="0" i="0" u="none" strike="noStrike" kern="1200" baseline="0">
+            <a:defRPr sz="1800" b="0" i="0" u="none" strike="noStrike" kern="1200" baseline="0">
               <a:solidFill>
                 <a:schemeClr val="lt1">
                   <a:lumMod val="75000"/>
@@ -2042,7 +2042,7 @@
           <a:lstStyle/>
           <a:p>
             <a:pPr>
-              <a:defRPr sz="900" b="0" i="0" u="none" strike="noStrike" kern="1200" baseline="0">
+              <a:defRPr sz="1800" b="0" i="0" u="none" strike="noStrike" kern="1200" baseline="0">
                 <a:solidFill>
                   <a:schemeClr val="lt1">
                     <a:lumMod val="85000"/>
@@ -2100,7 +2100,7 @@
           <a:lstStyle/>
           <a:p>
             <a:pPr>
-              <a:defRPr sz="900" b="0" i="0" u="none" strike="noStrike" kern="1200" baseline="0">
+              <a:defRPr sz="1800" b="0" i="0" u="none" strike="noStrike" kern="1200" baseline="0">
                 <a:solidFill>
                   <a:schemeClr val="lt1">
                     <a:lumMod val="85000"/>
@@ -2142,7 +2142,7 @@
         <a:lstStyle/>
         <a:p>
           <a:pPr>
-            <a:defRPr sz="900" b="0" i="0" u="none" strike="noStrike" kern="1200" baseline="0">
+            <a:defRPr sz="1800" b="0" i="0" u="none" strike="noStrike" kern="1200" baseline="0">
               <a:solidFill>
                 <a:schemeClr val="lt1">
                   <a:lumMod val="85000"/>
@@ -5293,6 +5293,68 @@
       </p:grpSpPr>
       <p:sp>
         <p:nvSpPr>
+          <p:cNvPr id="26" name="Rounded Rectangle 25"/>
+          <p:cNvSpPr/>
+          <p:nvPr/>
+        </p:nvSpPr>
+        <p:spPr>
+          <a:xfrm>
+            <a:off x="1941455" y="-22419"/>
+            <a:ext cx="28716345" cy="2790865"/>
+          </a:xfrm>
+          <a:prstGeom prst="roundRect">
+            <a:avLst/>
+          </a:prstGeom>
+          <a:solidFill>
+            <a:srgbClr val="FFC000"/>
+          </a:solidFill>
+          <a:ln>
+            <a:noFill/>
+          </a:ln>
+          <a:effectLst>
+            <a:glow rad="101600">
+              <a:srgbClr val="FFC000">
+                <a:alpha val="60000"/>
+              </a:srgbClr>
+            </a:glow>
+          </a:effectLst>
+          <a:scene3d>
+            <a:camera prst="orthographicFront"/>
+            <a:lightRig rig="threePt" dir="t"/>
+          </a:scene3d>
+          <a:sp3d/>
+        </p:spPr>
+        <p:style>
+          <a:lnRef idx="2">
+            <a:schemeClr val="accent1">
+              <a:shade val="50000"/>
+            </a:schemeClr>
+          </a:lnRef>
+          <a:fillRef idx="1">
+            <a:schemeClr val="accent1"/>
+          </a:fillRef>
+          <a:effectRef idx="0">
+            <a:schemeClr val="accent1"/>
+          </a:effectRef>
+          <a:fontRef idx="minor">
+            <a:schemeClr val="lt1"/>
+          </a:fontRef>
+        </p:style>
+        <p:txBody>
+          <a:bodyPr rtlCol="0" anchor="ctr">
+            <a:sp3d extrusionH="57150">
+              <a:bevelT w="38100" h="38100" prst="angle"/>
+            </a:sp3d>
+          </a:bodyPr>
+          <a:lstStyle/>
+          <a:p>
+            <a:pPr algn="ctr"/>
+            <a:endParaRPr lang="en-US"/>
+          </a:p>
+        </p:txBody>
+      </p:sp>
+      <p:sp>
+        <p:nvSpPr>
           <p:cNvPr id="2" name="Title 1"/>
           <p:cNvSpPr>
             <a:spLocks noGrp="1"/>
@@ -5303,8 +5365,8 @@
         </p:nvSpPr>
         <p:spPr>
           <a:xfrm>
-            <a:off x="9196575" y="-847710"/>
-            <a:ext cx="16152060" cy="5227230"/>
+            <a:off x="399973" y="-1785925"/>
+            <a:ext cx="32089982" cy="5227230"/>
           </a:xfrm>
           <a:effectLst>
             <a:glow rad="1333500">
@@ -6772,61 +6834,6 @@
           </a:p>
         </p:txBody>
       </p:sp>
-      <p:sp>
-        <p:nvSpPr>
-          <p:cNvPr id="52" name="Rounded Rectangle 51"/>
-          <p:cNvSpPr/>
-          <p:nvPr/>
-        </p:nvSpPr>
-        <p:spPr>
-          <a:xfrm>
-            <a:off x="383653" y="116532"/>
-            <a:ext cx="8812922" cy="4278094"/>
-          </a:xfrm>
-          <a:prstGeom prst="roundRect">
-            <a:avLst/>
-          </a:prstGeom>
-          <a:solidFill>
-            <a:schemeClr val="bg1"/>
-          </a:solidFill>
-          <a:ln>
-            <a:solidFill>
-              <a:schemeClr val="bg1"/>
-            </a:solidFill>
-          </a:ln>
-          <a:effectLst>
-            <a:outerShdw blurRad="50800" dist="38100" dir="2700000" algn="tl" rotWithShape="0">
-              <a:prstClr val="black">
-                <a:alpha val="40000"/>
-              </a:prstClr>
-            </a:outerShdw>
-          </a:effectLst>
-        </p:spPr>
-        <p:style>
-          <a:lnRef idx="2">
-            <a:schemeClr val="accent1">
-              <a:shade val="50000"/>
-            </a:schemeClr>
-          </a:lnRef>
-          <a:fillRef idx="1">
-            <a:schemeClr val="accent1"/>
-          </a:fillRef>
-          <a:effectRef idx="0">
-            <a:schemeClr val="accent1"/>
-          </a:effectRef>
-          <a:fontRef idx="minor">
-            <a:schemeClr val="lt1"/>
-          </a:fontRef>
-        </p:style>
-        <p:txBody>
-          <a:bodyPr rtlCol="0" anchor="ctr"/>
-          <a:lstStyle/>
-          <a:p>
-            <a:pPr algn="ctr"/>
-            <a:endParaRPr lang="en-US"/>
-          </a:p>
-        </p:txBody>
-      </p:sp>
       <p:grpSp>
         <p:nvGrpSpPr>
           <p:cNvPr id="27" name="Group 26"/>
@@ -6835,8 +6842,8 @@
         </p:nvGrpSpPr>
         <p:grpSpPr>
           <a:xfrm>
-            <a:off x="339620" y="4574116"/>
-            <a:ext cx="8743672" cy="9297713"/>
+            <a:off x="288220" y="3135925"/>
+            <a:ext cx="9139537" cy="11414831"/>
             <a:chOff x="338718" y="5161102"/>
             <a:chExt cx="8743672" cy="8521584"/>
           </a:xfrm>
@@ -7106,8 +7113,8 @@
           </p:nvSpPr>
           <p:spPr>
             <a:xfrm>
-              <a:off x="846851" y="5179247"/>
-              <a:ext cx="7809796" cy="8265086"/>
+              <a:off x="512229" y="5200567"/>
+              <a:ext cx="8480892" cy="8241332"/>
             </a:xfrm>
             <a:prstGeom prst="rect">
               <a:avLst/>
@@ -7122,8 +7129,8 @@
             <a:p>
               <a:pPr algn="ctr"/>
               <a:r>
-                <a:rPr lang="en-US" sz="3200" b="1" dirty="0"/>
-                <a:t>Introduction</a:t>
+                <a:rPr lang="en-US" sz="3200" b="1" dirty="0" smtClean="0"/>
+                <a:t>Introduction and Abstract</a:t>
               </a:r>
               <a:endParaRPr lang="en-US" sz="3200" dirty="0"/>
             </a:p>
@@ -7133,43 +7140,171 @@
             <a:p>
               <a:r>
                 <a:rPr lang="en-US" sz="2400" dirty="0" smtClean="0"/>
-                <a:t>Sometimes</a:t>
+                <a:t>Getting from one </a:t>
+              </a:r>
+              <a:r>
+                <a:rPr lang="en-US" sz="2400" dirty="0"/>
+                <a:t>place to </a:t>
               </a:r>
               <a:r>
                 <a:rPr lang="en-US" sz="2400" dirty="0" smtClean="0"/>
-                <a:t>, </a:t>
+                <a:t>another, such as </a:t>
+              </a:r>
+              <a:r>
+                <a:rPr lang="en-US" sz="2400" dirty="0"/>
+                <a:t>with Google maps, moving characters in a </a:t>
               </a:r>
               <a:r>
                 <a:rPr lang="en-US" sz="2400" dirty="0" smtClean="0"/>
-                <a:t>we</a:t>
+                <a:t>videogame</a:t>
+              </a:r>
+              <a:r>
+                <a:rPr lang="en-US" sz="2400" dirty="0"/>
+                <a:t>, or even helping a robot navigate a </a:t>
               </a:r>
               <a:r>
                 <a:rPr lang="en-US" sz="2400" dirty="0" smtClean="0"/>
-                <a:t> </a:t>
+                <a:t>maze, requires </a:t>
               </a:r>
               <a:r>
                 <a:rPr lang="en-US" sz="2400" dirty="0" smtClean="0"/>
-                <a:t>need an algorithm to </a:t>
-              </a:r>
+                <a:t>algorithms. These algorithms are called path-finding algorithms. The best algorithms work fastest and find shortest paths.</a:t>
+              </a:r>
+            </a:p>
+            <a:p>
+              <a:endParaRPr lang="en-US" sz="2400" dirty="0" smtClean="0"/>
+            </a:p>
+            <a:p>
+              <a:r>
+                <a:rPr lang="en-US" sz="2400" b="1" dirty="0" smtClean="0"/>
+                <a:t>What </a:t>
+              </a:r>
+              <a:r>
+                <a:rPr lang="en-US" sz="2400" b="1" dirty="0"/>
+                <a:t>is a Pathfinding algorithm? </a:t>
+              </a:r>
+              <a:endParaRPr lang="en-US" sz="2400" dirty="0"/>
+            </a:p>
+            <a:p>
               <a:r>
                 <a:rPr lang="en-US" sz="2400" dirty="0" smtClean="0"/>
-                <a:t>go from </a:t>
+                <a:t>A </a:t>
+              </a:r>
+              <a:r>
+                <a:rPr lang="en-US" sz="2400" dirty="0"/>
+                <a:t>pathfinding algorithm is an algorithm which computes a path between point </a:t>
               </a:r>
               <a:r>
                 <a:rPr lang="en-US" sz="2400" dirty="0" smtClean="0"/>
-                <a:t>one place to </a:t>
+                <a:t>A </a:t>
+              </a:r>
+              <a:r>
+                <a:rPr lang="en-US" sz="2400" dirty="0"/>
+                <a:t>and point </a:t>
               </a:r>
               <a:r>
                 <a:rPr lang="en-US" sz="2400" dirty="0" smtClean="0"/>
-                <a:t>another, like with Google maps, moving characters in a game, </a:t>
+                <a:t>B </a:t>
+              </a:r>
+              <a:r>
+                <a:rPr lang="en-US" sz="2400" dirty="0"/>
+                <a:t>on a </a:t>
               </a:r>
               <a:r>
                 <a:rPr lang="en-US" sz="2400" dirty="0" smtClean="0"/>
-                <a:t>or even helping a robot navigate a maze. </a:t>
+                <a:t>grid. </a:t>
+              </a:r>
+              <a:r>
+                <a:rPr lang="en-US" sz="2400" dirty="0"/>
+                <a:t>These </a:t>
               </a:r>
               <a:r>
                 <a:rPr lang="en-US" sz="2400" dirty="0" smtClean="0"/>
-                <a:t>These algorithms are called path-finding algorithms.</a:t>
+                <a:t>grids </a:t>
+              </a:r>
+              <a:r>
+                <a:rPr lang="en-US" sz="2400" dirty="0"/>
+                <a:t>also include obstacles which the path cannot pass through. </a:t>
+              </a:r>
+              <a:endParaRPr lang="en-US" sz="2400" dirty="0" smtClean="0"/>
+            </a:p>
+            <a:p>
+              <a:endParaRPr lang="en-US" sz="2400" dirty="0" smtClean="0"/>
+            </a:p>
+            <a:p>
+              <a:r>
+                <a:rPr lang="en-US" sz="2400" b="1" dirty="0" smtClean="0"/>
+                <a:t>The Problem: </a:t>
+              </a:r>
+              <a:r>
+                <a:rPr lang="en-US" sz="2400" dirty="0" smtClean="0"/>
+                <a:t>In this project, I compared the performance of four well-known algorithms</a:t>
+              </a:r>
+              <a:r>
+                <a:rPr lang="en-US" sz="2400" dirty="0"/>
+                <a:t>: Dijkstra, A*, Breadth-First Search, and Best-First Search</a:t>
+              </a:r>
+              <a:r>
+                <a:rPr lang="en-US" sz="2400" dirty="0" smtClean="0"/>
+                <a:t>.</a:t>
+              </a:r>
+            </a:p>
+            <a:p>
+              <a:endParaRPr lang="en-US" sz="2400" dirty="0" smtClean="0"/>
+            </a:p>
+            <a:p>
+              <a:r>
+                <a:rPr lang="en-US" sz="2400" b="1" dirty="0" smtClean="0"/>
+                <a:t>Judging </a:t>
+              </a:r>
+              <a:r>
+                <a:rPr lang="en-US" sz="2400" b="1" dirty="0"/>
+                <a:t>the Best Algorithm</a:t>
+              </a:r>
+            </a:p>
+            <a:p>
+              <a:r>
+                <a:rPr lang="en-US" sz="2400" dirty="0" smtClean="0"/>
+                <a:t>The best pathfinding </a:t>
+              </a:r>
+              <a:r>
+                <a:rPr lang="en-US" sz="2400" dirty="0"/>
+                <a:t>algorithm </a:t>
+              </a:r>
+              <a:r>
+                <a:rPr lang="en-US" sz="2400" dirty="0" smtClean="0"/>
+                <a:t>was </a:t>
+              </a:r>
+              <a:r>
+                <a:rPr lang="en-US" sz="2400" dirty="0"/>
+                <a:t>decided based on accuracy,</a:t>
+              </a:r>
+              <a:r>
+                <a:rPr lang="en-US" sz="2400" dirty="0" smtClean="0"/>
+                <a:t> time</a:t>
+              </a:r>
+              <a:r>
+                <a:rPr lang="en-US" sz="2400" dirty="0"/>
+                <a:t>, and the amount of cells on the grid explored</a:t>
+              </a:r>
+              <a:r>
+                <a:rPr lang="en-US" sz="2400" dirty="0" smtClean="0"/>
+                <a:t>.</a:t>
+              </a:r>
+            </a:p>
+            <a:p>
+              <a:endParaRPr lang="en-US" sz="2400" dirty="0" smtClean="0"/>
+            </a:p>
+            <a:p>
+              <a:r>
+                <a:rPr lang="en-US" sz="2400" b="1" dirty="0" smtClean="0"/>
+                <a:t>Observations and Conclusion</a:t>
+              </a:r>
+            </a:p>
+            <a:p>
+              <a:r>
+                <a:rPr lang="en-US" sz="2400" dirty="0" smtClean="0"/>
+                <a:t>After running each algorithm through thirty different tests, I found that different algorithms performed very differently in terms of accuracy, speed, and area explored.</a:t>
               </a:r>
             </a:p>
             <a:p>
@@ -7177,115 +7312,55 @@
             </a:p>
             <a:p>
               <a:r>
+                <a:rPr lang="en-US" sz="2400" b="1" dirty="0" smtClean="0"/>
+                <a:t>Why </a:t>
+              </a:r>
+              <a:r>
                 <a:rPr lang="en-US" sz="2400" b="1" dirty="0"/>
-                <a:t>What is a Pathfinding algorithm? </a:t>
+                <a:t>did I choose this topic?</a:t>
               </a:r>
               <a:endParaRPr lang="en-US" sz="2400" dirty="0"/>
             </a:p>
             <a:p>
               <a:r>
                 <a:rPr lang="en-US" sz="2400" dirty="0" smtClean="0"/>
-                <a:t>A </a:t>
+                <a:t>Computer </a:t>
               </a:r>
               <a:r>
                 <a:rPr lang="en-US" sz="2400" dirty="0"/>
-                <a:t>pathfinding algorithm is an algorithm which computes a path between point a and point b on a </a:t>
+                <a:t>Science is one of </a:t>
               </a:r>
               <a:r>
                 <a:rPr lang="en-US" sz="2400" dirty="0" smtClean="0"/>
-                <a:t>grid. </a:t>
+                <a:t>my passions. </a:t>
               </a:r>
               <a:r>
                 <a:rPr lang="en-US" sz="2400" dirty="0"/>
-                <a:t>These </a:t>
+                <a:t>Before I started </a:t>
               </a:r>
               <a:r>
                 <a:rPr lang="en-US" sz="2400" dirty="0" smtClean="0"/>
-                <a:t>grids </a:t>
+                <a:t>this project, </a:t>
               </a:r>
               <a:r>
                 <a:rPr lang="en-US" sz="2400" dirty="0"/>
-                <a:t>also include obstacles which the path cannot pass through. </a:t>
+                <a:t>I </a:t>
               </a:r>
               <a:r>
                 <a:rPr lang="en-US" sz="2400" dirty="0" smtClean="0"/>
-                <a:t>The algorithm should run quickly and find a short(</a:t>
-              </a:r>
-              <a:r>
-                <a:rPr lang="en-US" sz="2400" dirty="0" err="1" smtClean="0"/>
-                <a:t>est</a:t>
+                <a:t>was </a:t>
+              </a:r>
+              <a:r>
+                <a:rPr lang="en-US" sz="2400" dirty="0"/>
+                <a:t>skilled at programming in multiple languages and I knew how to write simulations like this </a:t>
               </a:r>
               <a:r>
                 <a:rPr lang="en-US" sz="2400" dirty="0" smtClean="0"/>
-                <a:t>) path. In this project, I studied four well-known algorithms</a:t>
-              </a:r>
-              <a:r>
-                <a:rPr lang="en-US" sz="2400" dirty="0"/>
-                <a:t>: Dijkstra, A*, Breadth-First Search, and Best-First Search</a:t>
-              </a:r>
-              <a:r>
-                <a:rPr lang="en-US" sz="2400" dirty="0" smtClean="0"/>
-                <a:t>.</a:t>
+                <a:t>one. </a:t>
               </a:r>
             </a:p>
             <a:p>
-              <a:endParaRPr lang="en-US" sz="2400" b="1" dirty="0" smtClean="0"/>
-            </a:p>
-            <a:p>
-              <a:r>
-                <a:rPr lang="en-US" sz="2400" b="1" dirty="0" smtClean="0"/>
-                <a:t>Judging </a:t>
-              </a:r>
-              <a:r>
-                <a:rPr lang="en-US" sz="2400" b="1" dirty="0"/>
-                <a:t>the Best Algorithm</a:t>
-              </a:r>
-            </a:p>
-            <a:p>
-              <a:r>
-                <a:rPr lang="en-US" sz="2400" dirty="0" smtClean="0"/>
-                <a:t>The </a:t>
-              </a:r>
-              <a:r>
-                <a:rPr lang="en-US" sz="2400" dirty="0"/>
-                <a:t>best pathfinding algorithm will be decided based on accuracy, time, and the amount of cells on the grid explored.</a:t>
-              </a:r>
-              <a:endParaRPr lang="en-US" sz="2400" b="1" dirty="0"/>
-            </a:p>
-            <a:p>
-              <a:endParaRPr lang="en-US" sz="2400" dirty="0"/>
-            </a:p>
-            <a:p>
-              <a:r>
-                <a:rPr lang="en-US" sz="2400" b="1" dirty="0"/>
-                <a:t>Why did I choose this topic?</a:t>
-              </a:r>
-              <a:endParaRPr lang="en-US" sz="2400" dirty="0"/>
-            </a:p>
-            <a:p>
-              <a:r>
-                <a:rPr lang="en-US" sz="2400" dirty="0" smtClean="0"/>
-                <a:t>Computer </a:t>
-              </a:r>
-              <a:r>
-                <a:rPr lang="en-US" sz="2400" dirty="0"/>
-                <a:t>Science is one of </a:t>
-              </a:r>
-              <a:r>
-                <a:rPr lang="en-US" sz="2400" dirty="0" smtClean="0"/>
-                <a:t>my passions. </a:t>
-              </a:r>
-              <a:r>
-                <a:rPr lang="en-US" sz="2400" dirty="0"/>
-                <a:t>Before I started the experiment, I already was skilled at programming in multiple languages and I knew how to write simulations like this </a:t>
-              </a:r>
-              <a:r>
-                <a:rPr lang="en-US" sz="2400" dirty="0" smtClean="0"/>
-                <a:t>one. </a:t>
-              </a:r>
-            </a:p>
-            <a:p>
-              <a:endParaRPr lang="en-US" sz="2400" dirty="0" smtClean="0"/>
+              <a:endParaRPr lang="en-US" sz="2000" dirty="0" smtClean="0"/>
             </a:p>
           </p:txBody>
         </p:sp>
@@ -7298,10 +7373,10 @@
         </p:nvGrpSpPr>
         <p:grpSpPr>
           <a:xfrm>
-            <a:off x="329865" y="16587252"/>
-            <a:ext cx="8766763" cy="4987318"/>
+            <a:off x="25379578" y="3180272"/>
+            <a:ext cx="7116313" cy="7427931"/>
             <a:chOff x="329865" y="16764989"/>
-            <a:chExt cx="8766763" cy="5434249"/>
+            <a:chExt cx="8766763" cy="6416958"/>
           </a:xfrm>
         </p:grpSpPr>
         <p:sp>
@@ -7368,7 +7443,7 @@
           <p:spPr>
             <a:xfrm>
               <a:off x="849313" y="16974758"/>
-              <a:ext cx="7881602" cy="4896220"/>
+              <a:ext cx="7881602" cy="6207189"/>
             </a:xfrm>
             <a:prstGeom prst="rect">
               <a:avLst/>
@@ -7405,13 +7480,16 @@
               </a:r>
               <a:r>
                 <a:rPr lang="en-US" sz="2400" dirty="0" smtClean="0"/>
-                <a:t>enerate </a:t>
+                <a:t>enerate 5 different test grids </a:t>
               </a:r>
               <a:r>
                 <a:rPr lang="en-US" sz="2400" dirty="0" smtClean="0"/>
-                <a:t>a grid with a certain size. (10 by 10, etc. ). </a:t>
-              </a:r>
-              <a:endParaRPr lang="en-US" sz="2400" dirty="0" smtClean="0"/>
+                <a:t>with </a:t>
+              </a:r>
+              <a:r>
+                <a:rPr lang="en-US" sz="2400" dirty="0" smtClean="0"/>
+                <a:t>randomly generated or specifically designed obstacles.</a:t>
+              </a:r>
             </a:p>
             <a:p>
               <a:pPr marL="457200" indent="-457200">
@@ -7447,6 +7525,19 @@
               <a:r>
                 <a:rPr lang="en-US" sz="2400" dirty="0" smtClean="0"/>
                 <a:t>run. </a:t>
+              </a:r>
+            </a:p>
+            <a:p>
+              <a:pPr marL="457200" indent="-457200">
+                <a:buFont typeface="+mj-lt"/>
+                <a:buAutoNum type="arabicPeriod"/>
+              </a:pPr>
+              <a:endParaRPr lang="en-US" sz="2400" dirty="0"/>
+            </a:p>
+            <a:p>
+              <a:r>
+                <a:rPr lang="en-US" sz="2400" dirty="0" smtClean="0"/>
+                <a:t>All code was written in Unity C# inside the Unity Game Engine.</a:t>
               </a:r>
             </a:p>
             <a:p>
@@ -7520,10 +7611,10 @@
         </p:nvGrpSpPr>
         <p:grpSpPr>
           <a:xfrm>
-            <a:off x="333028" y="13777562"/>
-            <a:ext cx="8744787" cy="2602365"/>
-            <a:chOff x="343065" y="13233702"/>
-            <a:chExt cx="8744787" cy="2602365"/>
+            <a:off x="288518" y="19116430"/>
+            <a:ext cx="9008312" cy="2379738"/>
+            <a:chOff x="343065" y="12989154"/>
+            <a:chExt cx="8744787" cy="2746300"/>
           </a:xfrm>
         </p:grpSpPr>
         <p:sp>
@@ -7589,7 +7680,7 @@
           </p:nvSpPr>
           <p:spPr>
             <a:xfrm>
-              <a:off x="853758" y="13233702"/>
+              <a:off x="821634" y="12989154"/>
               <a:ext cx="7787647" cy="2123658"/>
             </a:xfrm>
             <a:prstGeom prst="rect">
@@ -7638,7 +7729,7 @@
           <p:spPr>
             <a:xfrm>
               <a:off x="906956" y="14420295"/>
-              <a:ext cx="7491092" cy="1415772"/>
+              <a:ext cx="7491092" cy="887962"/>
             </a:xfrm>
             <a:prstGeom prst="rect">
               <a:avLst/>
@@ -7652,27 +7743,21 @@
             <a:lstStyle/>
             <a:p>
               <a:r>
-                <a:rPr lang="en-US" sz="2400" dirty="0" smtClean="0"/>
-                <a:t>	</a:t>
-              </a:r>
-              <a:r>
                 <a:rPr lang="en-US" sz="2200" dirty="0" smtClean="0"/>
                 <a:t>I </a:t>
               </a:r>
               <a:r>
                 <a:rPr lang="en-US" sz="2200" dirty="0"/>
-                <a:t>believe that Best-First will </a:t>
+                <a:t>believe that </a:t>
               </a:r>
               <a:r>
                 <a:rPr lang="en-US" sz="2200" dirty="0" smtClean="0"/>
-                <a:t>be better than </a:t>
-              </a:r>
-              <a:r>
-                <a:rPr lang="en-US" sz="2200" dirty="0"/>
-                <a:t>all others because it is a lot faster, and, even though it is not 100%, I believe it will win with speed and efficiency. </a:t>
-              </a:r>
-            </a:p>
-            <a:p>
+                <a:t>Best-First will outperform the other methods in both speed </a:t>
+              </a:r>
+              <a:r>
+                <a:rPr lang="en-US" sz="2200" smtClean="0"/>
+                <a:t>and accuracy. </a:t>
+              </a:r>
               <a:endParaRPr lang="en-US" dirty="0"/>
             </a:p>
           </p:txBody>
@@ -7686,10 +7771,10 @@
         </p:nvGrpSpPr>
         <p:grpSpPr>
           <a:xfrm>
-            <a:off x="25924302" y="16866000"/>
-            <a:ext cx="6697764" cy="4803706"/>
+            <a:off x="25366157" y="18971019"/>
+            <a:ext cx="7124761" cy="2443869"/>
             <a:chOff x="25810395" y="4586438"/>
-            <a:chExt cx="6697764" cy="4803706"/>
+            <a:chExt cx="6734986" cy="4803706"/>
           </a:xfrm>
         </p:grpSpPr>
         <p:grpSp>
@@ -7800,8 +7885,8 @@
           </p:nvSpPr>
           <p:spPr>
             <a:xfrm>
-              <a:off x="26287045" y="4968113"/>
-              <a:ext cx="6089002" cy="4216539"/>
+              <a:off x="25965968" y="4744331"/>
+              <a:ext cx="6579413" cy="2800767"/>
             </a:xfrm>
             <a:prstGeom prst="rect">
               <a:avLst/>
@@ -7819,64 +7904,61 @@
                 <a:rPr lang="en-US" sz="3200" b="1" dirty="0" smtClean="0"/>
                 <a:t>Bibliography</a:t>
               </a:r>
-            </a:p>
-            <a:p>
-              <a:pPr algn="ctr"/>
               <a:endParaRPr lang="en-US" sz="3200" dirty="0"/>
             </a:p>
             <a:p>
               <a:r>
-                <a:rPr lang="en-US" sz="2400" b="1" u="sng" dirty="0">
+                <a:rPr lang="en-US" b="1" u="sng" dirty="0">
                   <a:hlinkClick r:id="rId4"/>
                 </a:rPr>
                 <a:t>www.wikipedia.org</a:t>
               </a:r>
-              <a:endParaRPr lang="en-US" sz="2400" dirty="0"/>
+              <a:endParaRPr lang="en-US" dirty="0"/>
             </a:p>
             <a:p>
               <a:r>
-                <a:rPr lang="en-US" sz="2400" b="1" u="sng" dirty="0">
+                <a:rPr lang="en-US" b="1" u="sng" dirty="0">
                   <a:hlinkClick r:id="rId5"/>
                 </a:rPr>
                 <a:t>www.theory.stanford.edu</a:t>
               </a:r>
-              <a:endParaRPr lang="en-US" sz="2400" dirty="0"/>
+              <a:endParaRPr lang="en-US" dirty="0"/>
             </a:p>
             <a:p>
               <a:r>
-                <a:rPr lang="en-US" sz="2400" b="1" u="sng" dirty="0">
+                <a:rPr lang="en-US" b="1" u="sng" dirty="0">
                   <a:hlinkClick r:id="rId6"/>
                 </a:rPr>
                 <a:t>www.gamedev.stackexchange.com</a:t>
               </a:r>
-              <a:endParaRPr lang="en-US" sz="2400" dirty="0"/>
+              <a:endParaRPr lang="en-US" dirty="0"/>
             </a:p>
             <a:p>
               <a:r>
-                <a:rPr lang="en-US" sz="2400" b="1" u="sng" dirty="0">
+                <a:rPr lang="en-US" b="1" u="sng" dirty="0">
                   <a:hlinkClick r:id="rId7"/>
                 </a:rPr>
                 <a:t>www.redblobgames.com/pathfinding/</a:t>
               </a:r>
-              <a:endParaRPr lang="en-US" sz="2400" dirty="0"/>
+              <a:endParaRPr lang="en-US" dirty="0"/>
             </a:p>
             <a:p>
               <a:r>
-                <a:rPr lang="en-US" sz="2400" b="1" dirty="0" smtClean="0">
+                <a:rPr lang="en-US" b="1" dirty="0" smtClean="0">
                   <a:hlinkClick r:id="rId8"/>
                 </a:rPr>
                 <a:t>stackoverflow.com/questions/1937690/c-sharp-priority-queue</a:t>
               </a:r>
-              <a:endParaRPr lang="en-US" sz="2400" dirty="0"/>
+              <a:endParaRPr lang="en-US" dirty="0"/>
             </a:p>
             <a:p>
               <a:r>
-                <a:rPr lang="en-US" sz="2400" b="1" u="sng" dirty="0">
+                <a:rPr lang="en-US" b="1" u="sng" dirty="0">
                   <a:hlinkClick r:id="rId9"/>
                 </a:rPr>
                 <a:t>www.ai-depot.com/Tutorial/PathFinding.html</a:t>
               </a:r>
-              <a:endParaRPr lang="en-US" sz="2400" dirty="0"/>
+              <a:endParaRPr lang="en-US" dirty="0"/>
             </a:p>
             <a:p>
               <a:r>
@@ -7900,13 +7982,13 @@
           <p:nvPr>
             <p:extLst>
               <p:ext uri="{D42A27DB-BD31-4B8C-83A1-F6EECF244321}">
-                <p14:modId xmlns:p14="http://schemas.microsoft.com/office/powerpoint/2010/main" val="1203172778"/>
+                <p14:modId xmlns:p14="http://schemas.microsoft.com/office/powerpoint/2010/main" val="1853135914"/>
               </p:ext>
             </p:extLst>
           </p:nvPr>
         </p:nvGraphicFramePr>
         <p:xfrm>
-          <a:off x="10493392" y="11002976"/>
+          <a:off x="10456202" y="10771215"/>
           <a:ext cx="4552113" cy="4373027"/>
         </p:xfrm>
         <a:graphic>
@@ -7924,14 +8006,14 @@
           <p:nvPr>
             <p:extLst>
               <p:ext uri="{D42A27DB-BD31-4B8C-83A1-F6EECF244321}">
-                <p14:modId xmlns:p14="http://schemas.microsoft.com/office/powerpoint/2010/main" val="648458587"/>
+                <p14:modId xmlns:p14="http://schemas.microsoft.com/office/powerpoint/2010/main" val="792759449"/>
               </p:ext>
             </p:extLst>
           </p:nvPr>
         </p:nvGraphicFramePr>
         <p:xfrm>
-          <a:off x="15175698" y="11002976"/>
-          <a:ext cx="4377266" cy="4373027"/>
+          <a:off x="15255606" y="10763432"/>
+          <a:ext cx="4423500" cy="4373027"/>
         </p:xfrm>
         <a:graphic>
           <a:graphicData uri="http://schemas.openxmlformats.org/drawingml/2006/chart">
@@ -7948,14 +8030,14 @@
           <p:nvPr>
             <p:extLst>
               <p:ext uri="{D42A27DB-BD31-4B8C-83A1-F6EECF244321}">
-                <p14:modId xmlns:p14="http://schemas.microsoft.com/office/powerpoint/2010/main" val="163963184"/>
+                <p14:modId xmlns:p14="http://schemas.microsoft.com/office/powerpoint/2010/main" val="699974157"/>
               </p:ext>
             </p:extLst>
           </p:nvPr>
         </p:nvGraphicFramePr>
         <p:xfrm>
-          <a:off x="19683157" y="10985303"/>
-          <a:ext cx="4666117" cy="4373027"/>
+          <a:off x="19951058" y="10756119"/>
+          <a:ext cx="4924812" cy="4349277"/>
         </p:xfrm>
         <a:graphic>
           <a:graphicData uri="http://schemas.openxmlformats.org/drawingml/2006/chart">
@@ -8027,7 +8109,7 @@
         </p:blipFill>
         <p:spPr>
           <a:xfrm>
-            <a:off x="11375580" y="6388255"/>
+            <a:off x="11376706" y="6376836"/>
             <a:ext cx="3557678" cy="3397865"/>
           </a:xfrm>
           <a:prstGeom prst="roundRect">
@@ -8175,9 +8257,9 @@
         <p:grpSpPr>
           <a:xfrm>
             <a:off x="16386904" y="4552908"/>
-            <a:ext cx="8280414" cy="4485738"/>
+            <a:ext cx="8400524" cy="4485738"/>
             <a:chOff x="16485257" y="4638088"/>
-            <a:chExt cx="8280414" cy="4130702"/>
+            <a:chExt cx="8400524" cy="4130702"/>
           </a:xfrm>
         </p:grpSpPr>
         <p:sp>
@@ -8322,10 +8404,10 @@
           </p:nvGrpSpPr>
           <p:grpSpPr>
             <a:xfrm>
-              <a:off x="22222092" y="6058227"/>
-              <a:ext cx="2543579" cy="2499855"/>
+              <a:off x="22222092" y="6058226"/>
+              <a:ext cx="2663689" cy="2478421"/>
               <a:chOff x="13126961" y="3904434"/>
-              <a:chExt cx="3364805" cy="3369639"/>
+              <a:chExt cx="3523694" cy="3340748"/>
             </a:xfrm>
           </p:grpSpPr>
           <p:pic>
@@ -8378,8 +8460,8 @@
             </p:nvSpPr>
             <p:spPr>
               <a:xfrm>
-                <a:off x="13927070" y="6873963"/>
-                <a:ext cx="2564696" cy="400110"/>
+                <a:off x="14085960" y="6845072"/>
+                <a:ext cx="2564695" cy="400110"/>
               </a:xfrm>
               <a:prstGeom prst="rect">
                 <a:avLst/>
@@ -8535,7 +8617,7 @@
         </p:nvSpPr>
         <p:spPr>
           <a:xfrm>
-            <a:off x="13496168" y="10231324"/>
+            <a:off x="13450596" y="9977586"/>
             <a:ext cx="7552873" cy="584775"/>
           </a:xfrm>
           <a:prstGeom prst="rect">
@@ -10232,10 +10314,10 @@
         </p:nvGrpSpPr>
         <p:grpSpPr>
           <a:xfrm>
-            <a:off x="25833549" y="4591111"/>
-            <a:ext cx="6867919" cy="8087240"/>
-            <a:chOff x="25640240" y="9562243"/>
-            <a:chExt cx="6867919" cy="8087240"/>
+            <a:off x="25366158" y="9634612"/>
+            <a:ext cx="7127882" cy="7187388"/>
+            <a:chOff x="25639946" y="13612905"/>
+            <a:chExt cx="6867919" cy="8695739"/>
           </a:xfrm>
         </p:grpSpPr>
         <p:sp>
@@ -10246,7 +10328,7 @@
           </p:nvSpPr>
           <p:spPr>
             <a:xfrm>
-              <a:off x="25640240" y="9562243"/>
+              <a:off x="25639946" y="13612905"/>
               <a:ext cx="6867919" cy="6998903"/>
             </a:xfrm>
             <a:prstGeom prst="roundRect">
@@ -10302,8 +10384,8 @@
           </p:nvSpPr>
           <p:spPr>
             <a:xfrm>
-              <a:off x="26167972" y="9924291"/>
-              <a:ext cx="6035152" cy="7725192"/>
+              <a:off x="25778466" y="13855918"/>
+              <a:ext cx="6530457" cy="8452726"/>
             </a:xfrm>
             <a:prstGeom prst="rect">
               <a:avLst/>
@@ -10321,6 +10403,7 @@
                 <a:rPr lang="en-US" sz="3200" b="1" dirty="0" smtClean="0"/>
                 <a:t>Results</a:t>
               </a:r>
+              <a:endParaRPr lang="en-US" sz="3200" b="1" dirty="0" smtClean="0"/>
             </a:p>
             <a:p>
               <a:pPr marL="342900" indent="-342900">
@@ -10443,10 +10526,10 @@
         </p:nvGrpSpPr>
         <p:grpSpPr>
           <a:xfrm>
-            <a:off x="25858981" y="11874460"/>
-            <a:ext cx="6852415" cy="4728978"/>
+            <a:off x="25366158" y="15770852"/>
+            <a:ext cx="7127882" cy="3431920"/>
             <a:chOff x="25665672" y="16845592"/>
-            <a:chExt cx="6852415" cy="4728978"/>
+            <a:chExt cx="6855418" cy="5367630"/>
           </a:xfrm>
         </p:grpSpPr>
         <p:sp>
@@ -10513,8 +10596,8 @@
           </p:nvSpPr>
           <p:spPr>
             <a:xfrm>
-              <a:off x="26184429" y="17108154"/>
-              <a:ext cx="5987631" cy="3447098"/>
+              <a:off x="25844534" y="17069539"/>
+              <a:ext cx="6676556" cy="5143683"/>
             </a:xfrm>
             <a:prstGeom prst="rect">
               <a:avLst/>
@@ -10535,9 +10618,6 @@
               <a:endParaRPr lang="en-US" sz="3200" b="1" dirty="0"/>
             </a:p>
             <a:p>
-              <a:endParaRPr lang="en-US" sz="2400" dirty="0" smtClean="0"/>
-            </a:p>
-            <a:p>
               <a:r>
                 <a:rPr lang="en-US" sz="2400" dirty="0" smtClean="0"/>
                 <a:t>The </a:t>
@@ -10556,11 +10636,7 @@
               </a:r>
               <a:r>
                 <a:rPr lang="en-US" sz="2400" dirty="0" smtClean="0"/>
-                <a:t> On custom mazes, the algorithms might perform differently, and </a:t>
-              </a:r>
-              <a:r>
-                <a:rPr lang="is-IS" sz="2400" smtClean="0"/>
-                <a:t>….</a:t>
+                <a:t> On custom mazes, the best performing algorithm will depend on the nature of the obstacles.</a:t>
               </a:r>
               <a:r>
                 <a:rPr lang="en-US" dirty="0"/>
@@ -10582,8 +10658,8 @@
         </p:nvSpPr>
         <p:spPr>
           <a:xfrm>
-            <a:off x="26067000" y="953560"/>
-            <a:ext cx="6049757" cy="2862322"/>
+            <a:off x="399972" y="1538757"/>
+            <a:ext cx="32089982" cy="1015663"/>
           </a:xfrm>
           <a:prstGeom prst="rect">
             <a:avLst/>
@@ -10599,48 +10675,474 @@
             <a:pPr algn="ctr"/>
             <a:r>
               <a:rPr lang="en-US" sz="6000" dirty="0" smtClean="0"/>
-              <a:t>Ethan Suresh </a:t>
+              <a:t>Ethan Suresh , </a:t>
             </a:r>
-          </a:p>
-          <a:p>
-            <a:pPr algn="ctr"/>
             <a:r>
-              <a:rPr lang="en-US" sz="6000" dirty="0" smtClean="0"/>
+              <a:rPr lang="en-US" sz="6000" smtClean="0"/>
               <a:t>7</a:t>
             </a:r>
             <a:r>
-              <a:rPr lang="en-US" sz="6000" baseline="30000" dirty="0" smtClean="0"/>
+              <a:rPr lang="en-US" sz="6000" baseline="30000" smtClean="0"/>
               <a:t>th</a:t>
             </a:r>
             <a:r>
-              <a:rPr lang="en-US" sz="6000" dirty="0" smtClean="0"/>
-              <a:t> </a:t>
+              <a:rPr lang="en-US" sz="6000" smtClean="0"/>
+              <a:t> Grade, Churchill </a:t>
             </a:r>
             <a:r>
               <a:rPr lang="en-US" sz="6000" dirty="0" smtClean="0"/>
-              <a:t>Grade</a:t>
-            </a:r>
-          </a:p>
-          <a:p>
-            <a:pPr algn="ctr"/>
-            <a:r>
-              <a:rPr lang="en-US" sz="6000" dirty="0" smtClean="0"/>
-              <a:t>Churchill Jr. High</a:t>
+              <a:t>Jr. High</a:t>
             </a:r>
             <a:endParaRPr lang="en-US" sz="6000" dirty="0"/>
           </a:p>
         </p:txBody>
       </p:sp>
+      <p:grpSp>
+        <p:nvGrpSpPr>
+          <p:cNvPr id="43" name="Group 42"/>
+          <p:cNvGrpSpPr/>
+          <p:nvPr/>
+        </p:nvGrpSpPr>
+        <p:grpSpPr>
+          <a:xfrm>
+            <a:off x="276277" y="7982149"/>
+            <a:ext cx="9657784" cy="11520801"/>
+            <a:chOff x="321758" y="10316981"/>
+            <a:chExt cx="9380938" cy="11520801"/>
+          </a:xfrm>
+        </p:grpSpPr>
+        <p:grpSp>
+          <p:nvGrpSpPr>
+            <p:cNvPr id="71" name="Group 70"/>
+            <p:cNvGrpSpPr/>
+            <p:nvPr/>
+          </p:nvGrpSpPr>
+          <p:grpSpPr>
+            <a:xfrm>
+              <a:off x="321758" y="10316981"/>
+              <a:ext cx="9380938" cy="11427530"/>
+              <a:chOff x="-264633" y="3305120"/>
+              <a:chExt cx="8566765" cy="14324688"/>
+            </a:xfrm>
+          </p:grpSpPr>
+          <p:sp>
+            <p:nvSpPr>
+              <p:cNvPr id="78" name="Rounded Rectangle 77"/>
+              <p:cNvSpPr/>
+              <p:nvPr/>
+            </p:nvSpPr>
+            <p:spPr>
+              <a:xfrm>
+                <a:off x="-264633" y="11694466"/>
+                <a:ext cx="8042562" cy="5935342"/>
+              </a:xfrm>
+              <a:prstGeom prst="roundRect">
+                <a:avLst/>
+              </a:prstGeom>
+              <a:ln>
+                <a:noFill/>
+              </a:ln>
+              <a:effectLst>
+                <a:outerShdw blurRad="50800" dist="38100" dir="2700000" algn="tl" rotWithShape="0">
+                  <a:prstClr val="black">
+                    <a:alpha val="40000"/>
+                  </a:prstClr>
+                </a:outerShdw>
+              </a:effectLst>
+            </p:spPr>
+            <p:style>
+              <a:lnRef idx="2">
+                <a:schemeClr val="dk1"/>
+              </a:lnRef>
+              <a:fillRef idx="1">
+                <a:schemeClr val="lt1"/>
+              </a:fillRef>
+              <a:effectRef idx="0">
+                <a:schemeClr val="dk1"/>
+              </a:effectRef>
+              <a:fontRef idx="minor">
+                <a:schemeClr val="dk1"/>
+              </a:fontRef>
+            </p:style>
+            <p:txBody>
+              <a:bodyPr rtlCol="0" anchor="ctr"/>
+              <a:lstStyle/>
+              <a:p>
+                <a:pPr algn="ctr"/>
+                <a:endParaRPr lang="en-US"/>
+              </a:p>
+            </p:txBody>
+          </p:sp>
+          <p:sp>
+            <p:nvSpPr>
+              <p:cNvPr id="81" name="Subtitle 2"/>
+              <p:cNvSpPr txBox="1">
+                <a:spLocks/>
+              </p:cNvSpPr>
+              <p:nvPr/>
+            </p:nvSpPr>
+            <p:spPr>
+              <a:xfrm>
+                <a:off x="305496" y="3305120"/>
+                <a:ext cx="7996636" cy="1591874"/>
+              </a:xfrm>
+              <a:prstGeom prst="rect">
+                <a:avLst/>
+              </a:prstGeom>
+            </p:spPr>
+            <p:txBody>
+              <a:bodyPr vert="horz" lIns="75675" tIns="37837" rIns="75675" bIns="37837" rtlCol="0">
+                <a:normAutofit/>
+              </a:bodyPr>
+              <a:lstStyle>
+                <a:lvl1pPr marL="0" indent="0" algn="l" defTabSz="3535710" rtl="0" eaLnBrk="1" latinLnBrk="0" hangingPunct="1">
+                  <a:lnSpc>
+                    <a:spcPct val="90000"/>
+                  </a:lnSpc>
+                  <a:spcBef>
+                    <a:spcPts val="3867"/>
+                  </a:spcBef>
+                  <a:buFont typeface="Arial" panose="020B0604020202020204" pitchFamily="34" charset="0"/>
+                  <a:buNone/>
+                  <a:defRPr sz="7733" kern="1200">
+                    <a:solidFill>
+                      <a:schemeClr val="tx1"/>
+                    </a:solidFill>
+                    <a:latin typeface="+mn-lt"/>
+                    <a:ea typeface="+mn-ea"/>
+                    <a:cs typeface="+mn-cs"/>
+                  </a:defRPr>
+                </a:lvl1pPr>
+                <a:lvl2pPr marL="1767855" indent="0" algn="ctr" defTabSz="3535710" rtl="0" eaLnBrk="1" latinLnBrk="0" hangingPunct="1">
+                  <a:lnSpc>
+                    <a:spcPct val="90000"/>
+                  </a:lnSpc>
+                  <a:spcBef>
+                    <a:spcPts val="1933"/>
+                  </a:spcBef>
+                  <a:buFont typeface="Arial" panose="020B0604020202020204" pitchFamily="34" charset="0"/>
+                  <a:buNone/>
+                  <a:defRPr sz="7733" kern="1200">
+                    <a:solidFill>
+                      <a:schemeClr val="tx1"/>
+                    </a:solidFill>
+                    <a:latin typeface="+mn-lt"/>
+                    <a:ea typeface="+mn-ea"/>
+                    <a:cs typeface="+mn-cs"/>
+                  </a:defRPr>
+                </a:lvl2pPr>
+                <a:lvl3pPr marL="3535710" indent="0" algn="ctr" defTabSz="3535710" rtl="0" eaLnBrk="1" latinLnBrk="0" hangingPunct="1">
+                  <a:lnSpc>
+                    <a:spcPct val="90000"/>
+                  </a:lnSpc>
+                  <a:spcBef>
+                    <a:spcPts val="1933"/>
+                  </a:spcBef>
+                  <a:buFont typeface="Arial" panose="020B0604020202020204" pitchFamily="34" charset="0"/>
+                  <a:buNone/>
+                  <a:defRPr sz="6960" kern="1200">
+                    <a:solidFill>
+                      <a:schemeClr val="tx1"/>
+                    </a:solidFill>
+                    <a:latin typeface="+mn-lt"/>
+                    <a:ea typeface="+mn-ea"/>
+                    <a:cs typeface="+mn-cs"/>
+                  </a:defRPr>
+                </a:lvl3pPr>
+                <a:lvl4pPr marL="5303566" indent="0" algn="ctr" defTabSz="3535710" rtl="0" eaLnBrk="1" latinLnBrk="0" hangingPunct="1">
+                  <a:lnSpc>
+                    <a:spcPct val="90000"/>
+                  </a:lnSpc>
+                  <a:spcBef>
+                    <a:spcPts val="1933"/>
+                  </a:spcBef>
+                  <a:buFont typeface="Arial" panose="020B0604020202020204" pitchFamily="34" charset="0"/>
+                  <a:buNone/>
+                  <a:defRPr sz="6187" kern="1200">
+                    <a:solidFill>
+                      <a:schemeClr val="tx1"/>
+                    </a:solidFill>
+                    <a:latin typeface="+mn-lt"/>
+                    <a:ea typeface="+mn-ea"/>
+                    <a:cs typeface="+mn-cs"/>
+                  </a:defRPr>
+                </a:lvl4pPr>
+                <a:lvl5pPr marL="7071421" indent="0" algn="ctr" defTabSz="3535710" rtl="0" eaLnBrk="1" latinLnBrk="0" hangingPunct="1">
+                  <a:lnSpc>
+                    <a:spcPct val="90000"/>
+                  </a:lnSpc>
+                  <a:spcBef>
+                    <a:spcPts val="1933"/>
+                  </a:spcBef>
+                  <a:buFont typeface="Arial" panose="020B0604020202020204" pitchFamily="34" charset="0"/>
+                  <a:buNone/>
+                  <a:defRPr sz="6187" kern="1200">
+                    <a:solidFill>
+                      <a:schemeClr val="tx1"/>
+                    </a:solidFill>
+                    <a:latin typeface="+mn-lt"/>
+                    <a:ea typeface="+mn-ea"/>
+                    <a:cs typeface="+mn-cs"/>
+                  </a:defRPr>
+                </a:lvl5pPr>
+                <a:lvl6pPr marL="8839276" indent="0" algn="ctr" defTabSz="3535710" rtl="0" eaLnBrk="1" latinLnBrk="0" hangingPunct="1">
+                  <a:lnSpc>
+                    <a:spcPct val="90000"/>
+                  </a:lnSpc>
+                  <a:spcBef>
+                    <a:spcPts val="1933"/>
+                  </a:spcBef>
+                  <a:buFont typeface="Arial" panose="020B0604020202020204" pitchFamily="34" charset="0"/>
+                  <a:buNone/>
+                  <a:defRPr sz="6187" kern="1200">
+                    <a:solidFill>
+                      <a:schemeClr val="tx1"/>
+                    </a:solidFill>
+                    <a:latin typeface="+mn-lt"/>
+                    <a:ea typeface="+mn-ea"/>
+                    <a:cs typeface="+mn-cs"/>
+                  </a:defRPr>
+                </a:lvl6pPr>
+                <a:lvl7pPr marL="10607131" indent="0" algn="ctr" defTabSz="3535710" rtl="0" eaLnBrk="1" latinLnBrk="0" hangingPunct="1">
+                  <a:lnSpc>
+                    <a:spcPct val="90000"/>
+                  </a:lnSpc>
+                  <a:spcBef>
+                    <a:spcPts val="1933"/>
+                  </a:spcBef>
+                  <a:buFont typeface="Arial" panose="020B0604020202020204" pitchFamily="34" charset="0"/>
+                  <a:buNone/>
+                  <a:defRPr sz="6187" kern="1200">
+                    <a:solidFill>
+                      <a:schemeClr val="tx1"/>
+                    </a:solidFill>
+                    <a:latin typeface="+mn-lt"/>
+                    <a:ea typeface="+mn-ea"/>
+                    <a:cs typeface="+mn-cs"/>
+                  </a:defRPr>
+                </a:lvl7pPr>
+                <a:lvl8pPr marL="12374987" indent="0" algn="ctr" defTabSz="3535710" rtl="0" eaLnBrk="1" latinLnBrk="0" hangingPunct="1">
+                  <a:lnSpc>
+                    <a:spcPct val="90000"/>
+                  </a:lnSpc>
+                  <a:spcBef>
+                    <a:spcPts val="1933"/>
+                  </a:spcBef>
+                  <a:buFont typeface="Arial" panose="020B0604020202020204" pitchFamily="34" charset="0"/>
+                  <a:buNone/>
+                  <a:defRPr sz="6187" kern="1200">
+                    <a:solidFill>
+                      <a:schemeClr val="tx1"/>
+                    </a:solidFill>
+                    <a:latin typeface="+mn-lt"/>
+                    <a:ea typeface="+mn-ea"/>
+                    <a:cs typeface="+mn-cs"/>
+                  </a:defRPr>
+                </a:lvl8pPr>
+                <a:lvl9pPr marL="14142842" indent="0" algn="ctr" defTabSz="3535710" rtl="0" eaLnBrk="1" latinLnBrk="0" hangingPunct="1">
+                  <a:lnSpc>
+                    <a:spcPct val="90000"/>
+                  </a:lnSpc>
+                  <a:spcBef>
+                    <a:spcPts val="1933"/>
+                  </a:spcBef>
+                  <a:buFont typeface="Arial" panose="020B0604020202020204" pitchFamily="34" charset="0"/>
+                  <a:buNone/>
+                  <a:defRPr sz="6187" kern="1200">
+                    <a:solidFill>
+                      <a:schemeClr val="tx1"/>
+                    </a:solidFill>
+                    <a:latin typeface="+mn-lt"/>
+                    <a:ea typeface="+mn-ea"/>
+                    <a:cs typeface="+mn-cs"/>
+                  </a:defRPr>
+                </a:lvl9pPr>
+              </a:lstStyle>
+              <a:p>
+                <a:pPr algn="ctr"/>
+                <a:endParaRPr lang="en-US" sz="6399" dirty="0">
+                  <a:latin typeface="Century Gothic"/>
+                  <a:cs typeface="Century Gothic"/>
+                </a:endParaRPr>
+              </a:p>
+            </p:txBody>
+          </p:sp>
+        </p:grpSp>
+        <p:sp>
+          <p:nvSpPr>
+            <p:cNvPr id="33" name="TextBox 32"/>
+            <p:cNvSpPr txBox="1"/>
+            <p:nvPr/>
+          </p:nvSpPr>
+          <p:spPr>
+            <a:xfrm>
+              <a:off x="976440" y="17190356"/>
+              <a:ext cx="7426527" cy="4647426"/>
+            </a:xfrm>
+            <a:prstGeom prst="rect">
+              <a:avLst/>
+            </a:prstGeom>
+            <a:noFill/>
+          </p:spPr>
+          <p:txBody>
+            <a:bodyPr wrap="square" rtlCol="0">
+              <a:spAutoFit/>
+            </a:bodyPr>
+            <a:lstStyle/>
+            <a:p>
+              <a:pPr algn="ctr"/>
+              <a:r>
+                <a:rPr lang="en-US" sz="3200" b="1" dirty="0" smtClean="0"/>
+                <a:t>The Algorithms </a:t>
+              </a:r>
+            </a:p>
+            <a:p>
+              <a:endParaRPr lang="en-US" sz="2400" dirty="0" smtClean="0"/>
+            </a:p>
+            <a:p>
+              <a:r>
+                <a:rPr lang="en-US" sz="2400" dirty="0" smtClean="0"/>
+                <a:t>All the algorithms explore from the start using different strategies:</a:t>
+              </a:r>
+            </a:p>
+            <a:p>
+              <a:pPr algn="ctr"/>
+              <a:endParaRPr lang="en-US" sz="2400" dirty="0" smtClean="0"/>
+            </a:p>
+            <a:p>
+              <a:pPr marL="457200" indent="-457200">
+                <a:buFont typeface="Arial" charset="0"/>
+                <a:buChar char="•"/>
+              </a:pPr>
+              <a:r>
+                <a:rPr lang="en-US" sz="2400" b="1" dirty="0" smtClean="0"/>
+                <a:t>Breadth-First: </a:t>
+              </a:r>
+              <a:r>
+                <a:rPr lang="en-US" sz="2400" dirty="0" smtClean="0"/>
+                <a:t>explores all possibilities one by one. </a:t>
+              </a:r>
+              <a:endParaRPr lang="en-US" sz="2400" b="1" dirty="0" smtClean="0"/>
+            </a:p>
+            <a:p>
+              <a:pPr marL="457200" indent="-457200">
+                <a:buFont typeface="Arial" charset="0"/>
+                <a:buChar char="•"/>
+              </a:pPr>
+              <a:r>
+                <a:rPr lang="en-US" sz="2400" b="1" dirty="0" smtClean="0"/>
+                <a:t>Best-First: </a:t>
+              </a:r>
+              <a:r>
+                <a:rPr lang="en-US" sz="2400" dirty="0" smtClean="0"/>
+                <a:t>tries </a:t>
+              </a:r>
+              <a:r>
+                <a:rPr lang="en-US" sz="2400" dirty="0"/>
+                <a:t>to go straight to the </a:t>
+              </a:r>
+              <a:r>
+                <a:rPr lang="en-US" sz="2400" dirty="0" smtClean="0"/>
+                <a:t>destination using an estimate. </a:t>
+              </a:r>
+            </a:p>
+            <a:p>
+              <a:pPr marL="457200" indent="-457200">
+                <a:buFont typeface="Arial" charset="0"/>
+                <a:buChar char="•"/>
+              </a:pPr>
+              <a:r>
+                <a:rPr lang="en-US" sz="2400" b="1" dirty="0" smtClean="0"/>
+                <a:t>Dijkstra: </a:t>
+              </a:r>
+              <a:r>
+                <a:rPr lang="en-US" sz="2400" dirty="0"/>
+                <a:t>A</a:t>
+              </a:r>
+              <a:r>
+                <a:rPr lang="en-US" sz="2400" dirty="0" smtClean="0"/>
+                <a:t> priority-based algorithm like Breadth-First but always correct. </a:t>
+              </a:r>
+            </a:p>
+            <a:p>
+              <a:pPr marL="457200" indent="-457200">
+                <a:buFont typeface="Arial" charset="0"/>
+                <a:buChar char="•"/>
+              </a:pPr>
+              <a:r>
+                <a:rPr lang="en-US" sz="2400" b="1" dirty="0" smtClean="0"/>
+                <a:t>A*: </a:t>
+              </a:r>
+              <a:r>
+                <a:rPr lang="en-US" sz="2400" dirty="0" smtClean="0"/>
+                <a:t>a combinatio</a:t>
+              </a:r>
+              <a:r>
+                <a:rPr lang="en-US" sz="2400" dirty="0"/>
+                <a:t>n</a:t>
+              </a:r>
+              <a:r>
+                <a:rPr lang="en-US" sz="2400" dirty="0" smtClean="0"/>
+                <a:t> of Dijkstra and Best-First</a:t>
+              </a:r>
+              <a:endParaRPr lang="en-US" sz="2400" dirty="0"/>
+            </a:p>
+            <a:p>
+              <a:pPr marL="457200" indent="-457200">
+                <a:buFont typeface="Arial" charset="0"/>
+                <a:buChar char="•"/>
+              </a:pPr>
+              <a:endParaRPr lang="en-US" sz="2400" b="1" dirty="0" smtClean="0"/>
+            </a:p>
+          </p:txBody>
+        </p:sp>
+      </p:grpSp>
+      <p:cxnSp>
+        <p:nvCxnSpPr>
+          <p:cNvPr id="49" name="Straight Arrow Connector 48"/>
+          <p:cNvCxnSpPr/>
+          <p:nvPr/>
+        </p:nvCxnSpPr>
+        <p:spPr>
+          <a:xfrm flipH="1">
+            <a:off x="12579298" y="6685613"/>
+            <a:ext cx="199817" cy="392122"/>
+          </a:xfrm>
+          <a:prstGeom prst="straightConnector1">
+            <a:avLst/>
+          </a:prstGeom>
+          <a:ln>
+            <a:solidFill>
+              <a:schemeClr val="accent6"/>
+            </a:solidFill>
+            <a:tailEnd type="triangle"/>
+          </a:ln>
+        </p:spPr>
+        <p:style>
+          <a:lnRef idx="1">
+            <a:schemeClr val="accent1"/>
+          </a:lnRef>
+          <a:fillRef idx="0">
+            <a:schemeClr val="accent1"/>
+          </a:fillRef>
+          <a:effectRef idx="0">
+            <a:schemeClr val="accent1"/>
+          </a:effectRef>
+          <a:fontRef idx="minor">
+            <a:schemeClr val="tx1"/>
+          </a:fontRef>
+        </p:style>
+      </p:cxnSp>
       <p:sp>
         <p:nvSpPr>
-          <p:cNvPr id="88" name="TextBox 87"/>
+          <p:cNvPr id="50" name="TextBox 49"/>
           <p:cNvSpPr txBox="1"/>
           <p:nvPr/>
         </p:nvSpPr>
         <p:spPr>
           <a:xfrm>
-            <a:off x="843721" y="116532"/>
-            <a:ext cx="7988730" cy="2800767"/>
+            <a:off x="12520413" y="6386410"/>
+            <a:ext cx="634006" cy="369332"/>
           </a:xfrm>
           <a:prstGeom prst="rect">
             <a:avLst/>
@@ -10653,28 +11155,197 @@
           </a:bodyPr>
           <a:lstStyle/>
           <a:p>
-            <a:pPr algn="ctr"/>
             <a:r>
-              <a:rPr lang="en-US" sz="3200" b="1" dirty="0" smtClean="0"/>
-              <a:t>Abstract</a:t>
+              <a:rPr lang="en-US" dirty="0" smtClean="0">
+                <a:solidFill>
+                  <a:srgbClr val="FFFF00"/>
+                </a:solidFill>
+              </a:rPr>
+              <a:t>Start</a:t>
             </a:r>
+            <a:endParaRPr lang="en-US" dirty="0">
+              <a:solidFill>
+                <a:srgbClr val="FFFF00"/>
+              </a:solidFill>
+            </a:endParaRPr>
           </a:p>
+        </p:txBody>
+      </p:sp>
+      <p:cxnSp>
+        <p:nvCxnSpPr>
+          <p:cNvPr id="83" name="Straight Arrow Connector 82"/>
+          <p:cNvCxnSpPr/>
+          <p:nvPr/>
+        </p:nvCxnSpPr>
+        <p:spPr>
+          <a:xfrm flipH="1">
+            <a:off x="14199998" y="7848854"/>
+            <a:ext cx="539310" cy="106532"/>
+          </a:xfrm>
+          <a:prstGeom prst="straightConnector1">
+            <a:avLst/>
+          </a:prstGeom>
+          <a:ln>
+            <a:solidFill>
+              <a:schemeClr val="accent6"/>
+            </a:solidFill>
+            <a:tailEnd type="triangle"/>
+          </a:ln>
+        </p:spPr>
+        <p:style>
+          <a:lnRef idx="1">
+            <a:schemeClr val="accent1"/>
+          </a:lnRef>
+          <a:fillRef idx="0">
+            <a:schemeClr val="accent1"/>
+          </a:fillRef>
+          <a:effectRef idx="0">
+            <a:schemeClr val="accent1"/>
+          </a:effectRef>
+          <a:fontRef idx="minor">
+            <a:schemeClr val="tx1"/>
+          </a:fontRef>
+        </p:style>
+      </p:cxnSp>
+      <p:sp>
+        <p:nvSpPr>
+          <p:cNvPr id="85" name="TextBox 84"/>
+          <p:cNvSpPr txBox="1"/>
+          <p:nvPr/>
+        </p:nvSpPr>
+        <p:spPr>
+          <a:xfrm>
+            <a:off x="14669047" y="7638887"/>
+            <a:ext cx="634006" cy="369332"/>
+          </a:xfrm>
+          <a:prstGeom prst="rect">
+            <a:avLst/>
+          </a:prstGeom>
+          <a:noFill/>
+        </p:spPr>
+        <p:txBody>
+          <a:bodyPr wrap="square" rtlCol="0">
+            <a:spAutoFit/>
+          </a:bodyPr>
+          <a:lstStyle/>
           <a:p>
             <a:r>
-              <a:rPr lang="en-US" sz="2400" dirty="0" smtClean="0"/>
-              <a:t>	</a:t>
+              <a:rPr lang="en-US" dirty="0" smtClean="0">
+                <a:solidFill>
+                  <a:srgbClr val="FFFF00"/>
+                </a:solidFill>
+              </a:rPr>
+              <a:t>End</a:t>
             </a:r>
+            <a:endParaRPr lang="en-US" dirty="0">
+              <a:solidFill>
+                <a:srgbClr val="FFFF00"/>
+              </a:solidFill>
+            </a:endParaRPr>
           </a:p>
+        </p:txBody>
+      </p:sp>
+      <p:cxnSp>
+        <p:nvCxnSpPr>
+          <p:cNvPr id="86" name="Straight Arrow Connector 85"/>
+          <p:cNvCxnSpPr/>
+          <p:nvPr/>
+        </p:nvCxnSpPr>
+        <p:spPr>
+          <a:xfrm flipV="1">
+            <a:off x="13154419" y="8297462"/>
+            <a:ext cx="141856" cy="545878"/>
+          </a:xfrm>
+          <a:prstGeom prst="straightConnector1">
+            <a:avLst/>
+          </a:prstGeom>
+          <a:ln>
+            <a:solidFill>
+              <a:schemeClr val="accent6"/>
+            </a:solidFill>
+            <a:tailEnd type="triangle"/>
+          </a:ln>
+        </p:spPr>
+        <p:style>
+          <a:lnRef idx="1">
+            <a:schemeClr val="accent1"/>
+          </a:lnRef>
+          <a:fillRef idx="0">
+            <a:schemeClr val="accent1"/>
+          </a:fillRef>
+          <a:effectRef idx="0">
+            <a:schemeClr val="accent1"/>
+          </a:effectRef>
+          <a:fontRef idx="minor">
+            <a:schemeClr val="tx1"/>
+          </a:fontRef>
+        </p:style>
+      </p:cxnSp>
+      <p:sp>
+        <p:nvSpPr>
+          <p:cNvPr id="91" name="TextBox 90"/>
+          <p:cNvSpPr txBox="1"/>
+          <p:nvPr/>
+        </p:nvSpPr>
+        <p:spPr>
+          <a:xfrm>
+            <a:off x="12872685" y="8796070"/>
+            <a:ext cx="634006" cy="369332"/>
+          </a:xfrm>
+          <a:prstGeom prst="rect">
+            <a:avLst/>
+          </a:prstGeom>
+          <a:noFill/>
+        </p:spPr>
+        <p:txBody>
+          <a:bodyPr wrap="square" rtlCol="0">
+            <a:spAutoFit/>
+          </a:bodyPr>
+          <a:lstStyle/>
           <a:p>
             <a:r>
-              <a:rPr lang="en-US" sz="2400" dirty="0" smtClean="0"/>
-              <a:t>Characters in videogames need to find quick paths to destinations. This is difficult when there are obstacles. There are different algorithms for finding paths between points. </a:t>
+              <a:rPr lang="en-US" dirty="0" smtClean="0">
+                <a:solidFill>
+                  <a:srgbClr val="FFFF00"/>
+                </a:solidFill>
+              </a:rPr>
+              <a:t>Path</a:t>
             </a:r>
+            <a:endParaRPr lang="en-US" dirty="0">
+              <a:solidFill>
+                <a:srgbClr val="FFFF00"/>
+              </a:solidFill>
+            </a:endParaRPr>
+          </a:p>
+        </p:txBody>
+      </p:sp>
+      <p:sp>
+        <p:nvSpPr>
+          <p:cNvPr id="92" name="TextBox 91"/>
+          <p:cNvSpPr txBox="1"/>
+          <p:nvPr/>
+        </p:nvSpPr>
+        <p:spPr>
+          <a:xfrm>
+            <a:off x="14469653" y="15314250"/>
+            <a:ext cx="6814195" cy="369332"/>
+          </a:xfrm>
+          <a:prstGeom prst="rect">
+            <a:avLst/>
+          </a:prstGeom>
+          <a:noFill/>
+        </p:spPr>
+        <p:txBody>
+          <a:bodyPr wrap="square" rtlCol="0">
+            <a:spAutoFit/>
+          </a:bodyPr>
+          <a:lstStyle/>
+          <a:p>
             <a:r>
-              <a:rPr lang="en-US" sz="2400" smtClean="0"/>
-              <a:t>My goal was to experiment with these algorithms and find which ones worked fastest and gave the shortest paths. </a:t>
+              <a:rPr lang="en-US" smtClean="0"/>
+              <a:t>(X-axis is the size of the grid, Y-Axis is aspect being measured)</a:t>
             </a:r>
-            <a:endParaRPr lang="en-US" sz="2400" dirty="0" smtClean="0"/>
+            <a:endParaRPr lang="en-US"/>
           </a:p>
         </p:txBody>
       </p:sp>

</xml_diff>